<commit_message>
colour change - web 2
</commit_message>
<xml_diff>
--- a/unit-1-sem-1/calendar.pptx
+++ b/unit-1-sem-1/calendar.pptx
@@ -3450,7 +3450,7 @@
           </a:ln>
           <a:extLst>
             <a:ext uri="{C572A759-6A51-4108-AA02-DFA0A04FC94B}">
-              <ma14:wrappingTextBoxFlag xmlns="" xmlns:m="http://schemas.openxmlformats.org/officeDocument/2006/math" xmlns:a14="http://schemas.microsoft.com/office/drawing/2010/main" xmlns:ma14="http://schemas.microsoft.com/office/mac/drawingml/2011/main" val="1"/>
+              <ma14:wrappingTextBoxFlag xmlns:ma14="http://schemas.microsoft.com/office/mac/drawingml/2011/main" xmlns:a14="http://schemas.microsoft.com/office/drawing/2010/main" xmlns:m="http://schemas.openxmlformats.org/officeDocument/2006/math" xmlns="" val="1"/>
             </a:ext>
           </a:extLst>
         </p:spPr>
@@ -3487,7 +3487,7 @@
           </a:ln>
           <a:extLst>
             <a:ext uri="{C572A759-6A51-4108-AA02-DFA0A04FC94B}">
-              <ma14:wrappingTextBoxFlag xmlns="" xmlns:m="http://schemas.openxmlformats.org/officeDocument/2006/math" xmlns:a14="http://schemas.microsoft.com/office/drawing/2010/main" xmlns:ma14="http://schemas.microsoft.com/office/mac/drawingml/2011/main" val="1"/>
+              <ma14:wrappingTextBoxFlag xmlns:ma14="http://schemas.microsoft.com/office/mac/drawingml/2011/main" xmlns:a14="http://schemas.microsoft.com/office/drawing/2010/main" xmlns:m="http://schemas.openxmlformats.org/officeDocument/2006/math" xmlns="" val="1"/>
             </a:ext>
           </a:extLst>
         </p:spPr>
@@ -4328,10 +4328,10 @@
       </p:grpSpPr>
       <p:pic>
         <p:nvPicPr>
-          <p:cNvPr id="11" name="Picture 10">
+          <p:cNvPr id="7" name="Picture 6">
             <a:extLst>
               <a:ext uri="{FF2B5EF4-FFF2-40B4-BE49-F238E27FC236}">
-                <a16:creationId xmlns:a16="http://schemas.microsoft.com/office/drawing/2014/main" id="{14F8F669-7AFF-A281-E015-0531829E1C82}"/>
+                <a16:creationId xmlns:a16="http://schemas.microsoft.com/office/drawing/2014/main" id="{7CE1AB92-8265-4C11-5386-A70166D5120F}"/>
               </a:ext>
             </a:extLst>
           </p:cNvPr>
@@ -4341,15 +4341,14 @@
           <p:nvPr/>
         </p:nvPicPr>
         <p:blipFill>
-          <a:blip r:embed="rId3"/>
-          <a:stretch>
-            <a:fillRect/>
-          </a:stretch>
+          <a:blip r:embed="rId2"/>
+          <a:srcRect b="2539"/>
+          <a:stretch/>
         </p:blipFill>
         <p:spPr>
           <a:xfrm>
-            <a:off x="11671829" y="168869"/>
-            <a:ext cx="9747936" cy="13681101"/>
+            <a:off x="11502620" y="-61455"/>
+            <a:ext cx="10069046" cy="13608586"/>
           </a:xfrm>
           <a:prstGeom prst="rect">
             <a:avLst/>
@@ -4420,7 +4419,7 @@
           <p:nvPr/>
         </p:nvPicPr>
         <p:blipFill>
-          <a:blip r:embed="rId4"/>
+          <a:blip r:embed="rId3"/>
           <a:stretch>
             <a:fillRect/>
           </a:stretch>
@@ -4453,14 +4452,14 @@
           <p:nvPr/>
         </p:nvPicPr>
         <p:blipFill>
-          <a:blip r:embed="rId5"/>
+          <a:blip r:embed="rId4"/>
           <a:stretch>
             <a:fillRect/>
           </a:stretch>
         </p:blipFill>
         <p:spPr>
           <a:xfrm>
-            <a:off x="8052328" y="1753316"/>
+            <a:off x="7883119" y="1753316"/>
             <a:ext cx="3619501" cy="5664201"/>
           </a:xfrm>
           <a:prstGeom prst="rect">
@@ -4486,7 +4485,7 @@
           <p:nvPr/>
         </p:nvPicPr>
         <p:blipFill>
-          <a:blip r:embed="rId6"/>
+          <a:blip r:embed="rId5"/>
           <a:stretch>
             <a:fillRect/>
           </a:stretch>
@@ -4519,7 +4518,7 @@
           <p:nvPr/>
         </p:nvPicPr>
         <p:blipFill>
-          <a:blip r:embed="rId7"/>
+          <a:blip r:embed="rId6"/>
           <a:stretch>
             <a:fillRect/>
           </a:stretch>
@@ -4738,7 +4737,7 @@
           <p:nvPr/>
         </p:nvPicPr>
         <p:blipFill>
-          <a:blip r:embed="rId8"/>
+          <a:blip r:embed="rId7"/>
           <a:stretch>
             <a:fillRect/>
           </a:stretch>
@@ -4768,7 +4767,7 @@
           <p:nvPr/>
         </p:nvPicPr>
         <p:blipFill>
-          <a:blip r:embed="rId9"/>
+          <a:blip r:embed="rId8"/>
           <a:stretch>
             <a:fillRect/>
           </a:stretch>
@@ -4834,7 +4833,7 @@
           </a:prstGeom>
           <a:extLst>
             <a:ext uri="{C572A759-6A51-4108-AA02-DFA0A04FC94B}">
-              <ma14:wrappingTextBoxFlag xmlns="" xmlns:m="http://schemas.openxmlformats.org/officeDocument/2006/math" xmlns:a14="http://schemas.microsoft.com/office/drawing/2010/main" xmlns:ma14="http://schemas.microsoft.com/office/mac/drawingml/2011/main" val="1"/>
+              <ma14:wrappingTextBoxFlag xmlns:ma14="http://schemas.microsoft.com/office/mac/drawingml/2011/main" xmlns:a14="http://schemas.microsoft.com/office/drawing/2010/main" xmlns:m="http://schemas.openxmlformats.org/officeDocument/2006/math" xmlns="" val="1"/>
             </a:ext>
           </a:extLst>
         </p:spPr>
@@ -4983,7 +4982,7 @@
           </a:prstGeom>
           <a:extLst>
             <a:ext uri="{C572A759-6A51-4108-AA02-DFA0A04FC94B}">
-              <ma14:wrappingTextBoxFlag xmlns="" xmlns:m="http://schemas.openxmlformats.org/officeDocument/2006/math" xmlns:a14="http://schemas.microsoft.com/office/drawing/2010/main" xmlns:ma14="http://schemas.microsoft.com/office/mac/drawingml/2011/main" val="1"/>
+              <ma14:wrappingTextBoxFlag xmlns:ma14="http://schemas.microsoft.com/office/mac/drawingml/2011/main" xmlns:a14="http://schemas.microsoft.com/office/drawing/2010/main" xmlns:m="http://schemas.openxmlformats.org/officeDocument/2006/math" xmlns="" val="1"/>
             </a:ext>
           </a:extLst>
         </p:spPr>

</xml_diff>